<commit_message>
project revised after bootcamp
</commit_message>
<xml_diff>
--- a/your-code/cli_presentation.pptx
+++ b/your-code/cli_presentation.pptx
@@ -15240,7 +15240,7 @@
           <p:spPr>
             <a:xfrm>
               <a:off x="5483446" y="4344072"/>
-              <a:ext cx="397584" cy="246221"/>
+              <a:ext cx="397584" cy="215444"/>
             </a:xfrm>
             <a:prstGeom prst="rect">
               <a:avLst/>
@@ -15255,12 +15255,12 @@
             <a:p>
               <a:pPr algn="ctr"/>
               <a:r>
-                <a:rPr lang="en-US" sz="1000" i="1" dirty="0">
+                <a:rPr lang="en-US" sz="800" i="1" dirty="0">
                   <a:sym typeface="Wingdings" panose="05000000000000000000" pitchFamily="2" charset="2"/>
                 </a:rPr>
                 <a:t>WD</a:t>
               </a:r>
-              <a:endParaRPr lang="en-GB" sz="1000" i="1" dirty="0"/>
+              <a:endParaRPr lang="en-GB" sz="800" i="1" dirty="0"/>
             </a:p>
           </p:txBody>
         </p:sp>
@@ -15279,7 +15279,7 @@
           <p:spPr>
             <a:xfrm>
               <a:off x="5272018" y="4344072"/>
-              <a:ext cx="349690" cy="246221"/>
+              <a:ext cx="349690" cy="215444"/>
             </a:xfrm>
             <a:prstGeom prst="rect">
               <a:avLst/>
@@ -15294,12 +15294,12 @@
             <a:p>
               <a:pPr algn="ctr"/>
               <a:r>
-                <a:rPr lang="en-US" sz="1000" i="1" dirty="0">
+                <a:rPr lang="en-US" sz="800" i="1" dirty="0">
                   <a:sym typeface="Wingdings" panose="05000000000000000000" pitchFamily="2" charset="2"/>
                 </a:rPr>
                 <a:t>UX</a:t>
               </a:r>
-              <a:endParaRPr lang="en-GB" sz="1000" i="1" dirty="0"/>
+              <a:endParaRPr lang="en-GB" sz="800" i="1" dirty="0"/>
             </a:p>
           </p:txBody>
         </p:sp>
@@ -15318,7 +15318,7 @@
           <p:spPr>
             <a:xfrm>
               <a:off x="5025332" y="4340759"/>
-              <a:ext cx="397584" cy="246221"/>
+              <a:ext cx="397584" cy="215444"/>
             </a:xfrm>
             <a:prstGeom prst="rect">
               <a:avLst/>
@@ -15333,12 +15333,12 @@
             <a:p>
               <a:pPr algn="ctr"/>
               <a:r>
-                <a:rPr lang="en-US" sz="1000" i="1" dirty="0">
+                <a:rPr lang="en-US" sz="800" i="1" dirty="0">
                   <a:sym typeface="Wingdings" panose="05000000000000000000" pitchFamily="2" charset="2"/>
                 </a:rPr>
                 <a:t>DA</a:t>
               </a:r>
-              <a:endParaRPr lang="en-GB" sz="1000" i="1" dirty="0"/>
+              <a:endParaRPr lang="en-GB" sz="800" i="1" dirty="0"/>
             </a:p>
           </p:txBody>
         </p:sp>
@@ -15357,7 +15357,7 @@
           <p:spPr>
             <a:xfrm>
               <a:off x="5699654" y="4350685"/>
-              <a:ext cx="397584" cy="246221"/>
+              <a:ext cx="397584" cy="215444"/>
             </a:xfrm>
             <a:prstGeom prst="rect">
               <a:avLst/>
@@ -15372,12 +15372,12 @@
             <a:p>
               <a:pPr algn="ctr"/>
               <a:r>
-                <a:rPr lang="en-US" sz="1000" i="1" dirty="0">
+                <a:rPr lang="en-US" sz="800" i="1" dirty="0">
                   <a:sym typeface="Wingdings" panose="05000000000000000000" pitchFamily="2" charset="2"/>
                 </a:rPr>
                 <a:t>CS</a:t>
               </a:r>
-              <a:endParaRPr lang="en-GB" sz="1000" i="1" dirty="0"/>
+              <a:endParaRPr lang="en-GB" sz="800" i="1" dirty="0"/>
             </a:p>
           </p:txBody>
         </p:sp>
@@ -18453,7 +18453,7 @@
             </a:pPr>
             <a:r>
               <a:rPr lang="en-US" sz="1600" dirty="0" err="1"/>
-              <a:t>Shecodes</a:t>
+              <a:t>SheCodes</a:t>
             </a:r>
             <a:r>
               <a:rPr lang="en-US" sz="1600" dirty="0"/>
@@ -18492,7 +18492,7 @@
           <p:nvPr>
             <p:extLst>
               <p:ext uri="{D42A27DB-BD31-4B8C-83A1-F6EECF244321}">
-                <p14:modId xmlns:p14="http://schemas.microsoft.com/office/powerpoint/2010/main" val="3749205584"/>
+                <p14:modId xmlns:p14="http://schemas.microsoft.com/office/powerpoint/2010/main" val="2535308898"/>
               </p:ext>
             </p:extLst>
           </p:nvPr>
@@ -18778,7 +18778,7 @@
           <p:nvPr>
             <p:extLst>
               <p:ext uri="{D42A27DB-BD31-4B8C-83A1-F6EECF244321}">
-                <p14:modId xmlns:p14="http://schemas.microsoft.com/office/powerpoint/2010/main" val="358948201"/>
+                <p14:modId xmlns:p14="http://schemas.microsoft.com/office/powerpoint/2010/main" val="676729786"/>
               </p:ext>
             </p:extLst>
           </p:nvPr>

</xml_diff>